<commit_message>
ai presentation frontend ready for file submit and topic
</commit_message>
<xml_diff>
--- a/output/darkThemeMoonPresentation.pptx
+++ b/output/darkThemeMoonPresentation.pptx
@@ -1833,6 +1833,17 @@
             <a:pPr algn="r" indent="0" marL="0">
               <a:buNone/>
             </a:pPr>
+            <a:r>
+              <a:rPr lang="en-US" sz="1400" b="1" dirty="0">
+                <a:solidFill>
+                  <a:srgbClr val="F41C76"/>
+                </a:solidFill>
+                <a:latin typeface="Verdana" pitchFamily="34" charset="0"/>
+                <a:ea typeface="Verdana" pitchFamily="34" charset="-122"/>
+                <a:cs typeface="Verdana" pitchFamily="34" charset="-120"/>
+              </a:rPr>
+              <a:t>Made with Ai Flavoured</a:t>
+            </a:r>
             <a:endParaRPr lang="en-US" sz="1400" dirty="0"/>
           </a:p>
         </p:txBody>
@@ -2086,6 +2097,17 @@
             <a:pPr algn="r" indent="0" marL="0">
               <a:buNone/>
             </a:pPr>
+            <a:r>
+              <a:rPr lang="en-US" sz="1400" b="1" dirty="0">
+                <a:solidFill>
+                  <a:srgbClr val="F41C76"/>
+                </a:solidFill>
+                <a:latin typeface="Verdana" pitchFamily="34" charset="0"/>
+                <a:ea typeface="Verdana" pitchFamily="34" charset="-122"/>
+                <a:cs typeface="Verdana" pitchFamily="34" charset="-120"/>
+              </a:rPr>
+              <a:t>Made with Ai Flavoured</a:t>
+            </a:r>
             <a:endParaRPr lang="en-US" sz="1400" dirty="0"/>
           </a:p>
         </p:txBody>
@@ -2339,6 +2361,17 @@
             <a:pPr algn="r" indent="0" marL="0">
               <a:buNone/>
             </a:pPr>
+            <a:r>
+              <a:rPr lang="en-US" sz="1400" b="1" dirty="0">
+                <a:solidFill>
+                  <a:srgbClr val="F41C76"/>
+                </a:solidFill>
+                <a:latin typeface="Verdana" pitchFamily="34" charset="0"/>
+                <a:ea typeface="Verdana" pitchFamily="34" charset="-122"/>
+                <a:cs typeface="Verdana" pitchFamily="34" charset="-120"/>
+              </a:rPr>
+              <a:t>Made with Ai Flavoured</a:t>
+            </a:r>
             <a:endParaRPr lang="en-US" sz="1400" dirty="0"/>
           </a:p>
         </p:txBody>
@@ -2609,6 +2642,17 @@
             <a:pPr algn="r" indent="0" marL="0">
               <a:buNone/>
             </a:pPr>
+            <a:r>
+              <a:rPr lang="en-US" sz="1400" b="1" dirty="0">
+                <a:solidFill>
+                  <a:srgbClr val="F41C76"/>
+                </a:solidFill>
+                <a:latin typeface="Verdana" pitchFamily="34" charset="0"/>
+                <a:ea typeface="Verdana" pitchFamily="34" charset="-122"/>
+                <a:cs typeface="Verdana" pitchFamily="34" charset="-120"/>
+              </a:rPr>
+              <a:t>Made with Ai Flavoured</a:t>
+            </a:r>
             <a:endParaRPr lang="en-US" sz="1400" dirty="0"/>
           </a:p>
         </p:txBody>
@@ -2812,6 +2856,17 @@
             <a:pPr algn="r" indent="0" marL="0">
               <a:buNone/>
             </a:pPr>
+            <a:r>
+              <a:rPr lang="en-US" sz="1400" b="1" dirty="0">
+                <a:solidFill>
+                  <a:srgbClr val="F41C76"/>
+                </a:solidFill>
+                <a:latin typeface="Verdana" pitchFamily="34" charset="0"/>
+                <a:ea typeface="Verdana" pitchFamily="34" charset="-122"/>
+                <a:cs typeface="Verdana" pitchFamily="34" charset="-120"/>
+              </a:rPr>
+              <a:t>Made with Ai Flavoured</a:t>
+            </a:r>
             <a:endParaRPr lang="en-US" sz="1400" dirty="0"/>
           </a:p>
         </p:txBody>
@@ -3082,6 +3137,17 @@
             <a:pPr algn="r" indent="0" marL="0">
               <a:buNone/>
             </a:pPr>
+            <a:r>
+              <a:rPr lang="en-US" sz="1400" b="1" dirty="0">
+                <a:solidFill>
+                  <a:srgbClr val="F41C76"/>
+                </a:solidFill>
+                <a:latin typeface="Verdana" pitchFamily="34" charset="0"/>
+                <a:ea typeface="Verdana" pitchFamily="34" charset="-122"/>
+                <a:cs typeface="Verdana" pitchFamily="34" charset="-120"/>
+              </a:rPr>
+              <a:t>Made with Ai Flavoured</a:t>
+            </a:r>
             <a:endParaRPr lang="en-US" sz="1400" dirty="0"/>
           </a:p>
         </p:txBody>
@@ -3285,6 +3351,17 @@
             <a:pPr algn="r" indent="0" marL="0">
               <a:buNone/>
             </a:pPr>
+            <a:r>
+              <a:rPr lang="en-US" sz="1400" b="1" dirty="0">
+                <a:solidFill>
+                  <a:srgbClr val="F41C76"/>
+                </a:solidFill>
+                <a:latin typeface="Verdana" pitchFamily="34" charset="0"/>
+                <a:ea typeface="Verdana" pitchFamily="34" charset="-122"/>
+                <a:cs typeface="Verdana" pitchFamily="34" charset="-120"/>
+              </a:rPr>
+              <a:t>Made with Ai Flavoured</a:t>
+            </a:r>
             <a:endParaRPr lang="en-US" sz="1400" dirty="0"/>
           </a:p>
         </p:txBody>
@@ -3555,6 +3632,17 @@
             <a:pPr algn="r" indent="0" marL="0">
               <a:buNone/>
             </a:pPr>
+            <a:r>
+              <a:rPr lang="en-US" sz="1400" b="1" dirty="0">
+                <a:solidFill>
+                  <a:srgbClr val="F41C76"/>
+                </a:solidFill>
+                <a:latin typeface="Verdana" pitchFamily="34" charset="0"/>
+                <a:ea typeface="Verdana" pitchFamily="34" charset="-122"/>
+                <a:cs typeface="Verdana" pitchFamily="34" charset="-120"/>
+              </a:rPr>
+              <a:t>Made with Ai Flavoured</a:t>
+            </a:r>
             <a:endParaRPr lang="en-US" sz="1400" dirty="0"/>
           </a:p>
         </p:txBody>
@@ -3758,6 +3846,17 @@
             <a:pPr algn="r" indent="0" marL="0">
               <a:buNone/>
             </a:pPr>
+            <a:r>
+              <a:rPr lang="en-US" sz="1400" b="1" dirty="0">
+                <a:solidFill>
+                  <a:srgbClr val="F41C76"/>
+                </a:solidFill>
+                <a:latin typeface="Verdana" pitchFamily="34" charset="0"/>
+                <a:ea typeface="Verdana" pitchFamily="34" charset="-122"/>
+                <a:cs typeface="Verdana" pitchFamily="34" charset="-120"/>
+              </a:rPr>
+              <a:t>Made with Ai Flavoured</a:t>
+            </a:r>
             <a:endParaRPr lang="en-US" sz="1400" dirty="0"/>
           </a:p>
         </p:txBody>
@@ -3989,6 +4088,17 @@
             <a:pPr algn="r" indent="0" marL="0">
               <a:buNone/>
             </a:pPr>
+            <a:r>
+              <a:rPr lang="en-US" sz="1400" b="1" dirty="0">
+                <a:solidFill>
+                  <a:srgbClr val="F41C76"/>
+                </a:solidFill>
+                <a:latin typeface="Verdana" pitchFamily="34" charset="0"/>
+                <a:ea typeface="Verdana" pitchFamily="34" charset="-122"/>
+                <a:cs typeface="Verdana" pitchFamily="34" charset="-120"/>
+              </a:rPr>
+              <a:t>Made with Ai Flavoured</a:t>
+            </a:r>
             <a:endParaRPr lang="en-US" sz="1400" dirty="0"/>
           </a:p>
         </p:txBody>
@@ -4342,6 +4452,17 @@
             <a:pPr algn="r" indent="0" marL="0">
               <a:buNone/>
             </a:pPr>
+            <a:r>
+              <a:rPr lang="en-US" sz="1400" b="1" dirty="0">
+                <a:solidFill>
+                  <a:srgbClr val="F41C76"/>
+                </a:solidFill>
+                <a:latin typeface="Verdana" pitchFamily="34" charset="0"/>
+                <a:ea typeface="Verdana" pitchFamily="34" charset="-122"/>
+                <a:cs typeface="Verdana" pitchFamily="34" charset="-120"/>
+              </a:rPr>
+              <a:t>Made with Ai Flavoured</a:t>
+            </a:r>
             <a:endParaRPr lang="en-US" sz="1400" dirty="0"/>
           </a:p>
         </p:txBody>
@@ -4741,6 +4862,17 @@
             <a:pPr algn="r" indent="0" marL="0">
               <a:buNone/>
             </a:pPr>
+            <a:r>
+              <a:rPr lang="en-US" sz="1400" b="1" dirty="0">
+                <a:solidFill>
+                  <a:srgbClr val="F41C76"/>
+                </a:solidFill>
+                <a:latin typeface="Verdana" pitchFamily="34" charset="0"/>
+                <a:ea typeface="Verdana" pitchFamily="34" charset="-122"/>
+                <a:cs typeface="Verdana" pitchFamily="34" charset="-120"/>
+              </a:rPr>
+              <a:t>Made with Ai Flavoured</a:t>
+            </a:r>
             <a:endParaRPr lang="en-US" sz="1400" dirty="0"/>
           </a:p>
         </p:txBody>
@@ -4994,6 +5126,17 @@
             <a:pPr algn="r" indent="0" marL="0">
               <a:buNone/>
             </a:pPr>
+            <a:r>
+              <a:rPr lang="en-US" sz="1400" b="1" dirty="0">
+                <a:solidFill>
+                  <a:srgbClr val="F41C76"/>
+                </a:solidFill>
+                <a:latin typeface="Verdana" pitchFamily="34" charset="0"/>
+                <a:ea typeface="Verdana" pitchFamily="34" charset="-122"/>
+                <a:cs typeface="Verdana" pitchFamily="34" charset="-120"/>
+              </a:rPr>
+              <a:t>Made with Ai Flavoured</a:t>
+            </a:r>
             <a:endParaRPr lang="en-US" sz="1400" dirty="0"/>
           </a:p>
         </p:txBody>

</xml_diff>